<commit_message>
[ADD] Precedent and suivant button
</commit_message>
<xml_diff>
--- a/Groupie-tracker.pptx
+++ b/Groupie-tracker.pptx
@@ -258,7 +258,7 @@
             <a:pPr rtl="0"/>
             <a:fld id="{6E3F634E-7AAD-4D1B-8944-3921EA0E5915}" type="datetime1">
               <a:rPr lang="fr-FR" smtClean="0"/>
-              <a:t>30/03/2021</a:t>
+              <a:t>31/03/2021</a:t>
             </a:fld>
             <a:endParaRPr lang="fr-FR" dirty="0"/>
           </a:p>
@@ -439,7 +439,7 @@
             <a:fld id="{38C3045F-D32A-43F9-990C-99C552A137F5}" type="datetime1">
               <a:rPr lang="fr-FR" smtClean="0"/>
               <a:pPr/>
-              <a:t>30/03/2021</a:t>
+              <a:t>31/03/2021</a:t>
             </a:fld>
             <a:endParaRPr lang="fr-FR" dirty="0"/>
           </a:p>
@@ -1638,7 +1638,7 @@
             <a:pPr rtl="0"/>
             <a:fld id="{94783C35-8596-4843-9D3C-7B528D834CFC}" type="datetime1">
               <a:rPr lang="fr-FR" noProof="0" smtClean="0"/>
-              <a:t>30/03/2021</a:t>
+              <a:t>31/03/2021</a:t>
             </a:fld>
             <a:endParaRPr lang="fr-FR" noProof="0" dirty="0"/>
           </a:p>
@@ -1842,7 +1842,7 @@
             <a:pPr rtl="0"/>
             <a:fld id="{6B4382BA-0533-4C7D-AB6E-1EA1FDCFC04D}" type="datetime1">
               <a:rPr lang="fr-FR" noProof="0" smtClean="0"/>
-              <a:t>30/03/2021</a:t>
+              <a:t>31/03/2021</a:t>
             </a:fld>
             <a:endParaRPr lang="fr-FR" noProof="0" dirty="0"/>
           </a:p>
@@ -2056,7 +2056,7 @@
             <a:pPr rtl="0"/>
             <a:fld id="{E725F5DB-C5B6-45B6-B0FF-1F88144964AE}" type="datetime1">
               <a:rPr lang="fr-FR" noProof="0" smtClean="0"/>
-              <a:t>30/03/2021</a:t>
+              <a:t>31/03/2021</a:t>
             </a:fld>
             <a:endParaRPr lang="fr-FR" noProof="0" dirty="0"/>
           </a:p>
@@ -2260,7 +2260,7 @@
             <a:pPr rtl="0"/>
             <a:fld id="{7E7E6BF0-E032-45BA-8A88-5AF4AB6C9C64}" type="datetime1">
               <a:rPr lang="fr-FR" noProof="0" smtClean="0"/>
-              <a:t>30/03/2021</a:t>
+              <a:t>31/03/2021</a:t>
             </a:fld>
             <a:endParaRPr lang="fr-FR" noProof="0" dirty="0"/>
           </a:p>
@@ -2540,7 +2540,7 @@
             <a:pPr rtl="0"/>
             <a:fld id="{FBC8EAB8-8EC4-4264-928C-91F22A0F123A}" type="datetime1">
               <a:rPr lang="fr-FR" noProof="0" smtClean="0"/>
-              <a:t>30/03/2021</a:t>
+              <a:t>31/03/2021</a:t>
             </a:fld>
             <a:endParaRPr lang="fr-FR" noProof="0" dirty="0"/>
           </a:p>
@@ -2812,7 +2812,7 @@
             <a:pPr rtl="0"/>
             <a:fld id="{5DCE2717-4AE0-41B8-853A-157E74C7835C}" type="datetime1">
               <a:rPr lang="fr-FR" noProof="0" smtClean="0"/>
-              <a:t>30/03/2021</a:t>
+              <a:t>31/03/2021</a:t>
             </a:fld>
             <a:endParaRPr lang="fr-FR" noProof="0" dirty="0"/>
           </a:p>
@@ -3231,7 +3231,7 @@
             <a:pPr rtl="0"/>
             <a:fld id="{BEE7118C-0042-46B9-B6D4-26AB9DF2F067}" type="datetime1">
               <a:rPr lang="fr-FR" noProof="0" smtClean="0"/>
-              <a:t>30/03/2021</a:t>
+              <a:t>31/03/2021</a:t>
             </a:fld>
             <a:endParaRPr lang="fr-FR" noProof="0" dirty="0"/>
           </a:p>
@@ -3377,7 +3377,7 @@
             <a:pPr rtl="0"/>
             <a:fld id="{0B490D74-EF91-430C-8635-911973C75DDF}" type="datetime1">
               <a:rPr lang="fr-FR" noProof="0" smtClean="0"/>
-              <a:t>30/03/2021</a:t>
+              <a:t>31/03/2021</a:t>
             </a:fld>
             <a:endParaRPr lang="fr-FR" noProof="0" dirty="0"/>
           </a:p>
@@ -3493,7 +3493,7 @@
             <a:pPr rtl="0"/>
             <a:fld id="{37B6CDFD-A075-435E-ABCB-9EA9153DA35E}" type="datetime1">
               <a:rPr lang="fr-FR" noProof="0" smtClean="0"/>
-              <a:t>30/03/2021</a:t>
+              <a:t>31/03/2021</a:t>
             </a:fld>
             <a:endParaRPr lang="fr-FR" noProof="0" dirty="0"/>
           </a:p>
@@ -3810,7 +3810,7 @@
             <a:pPr rtl="0"/>
             <a:fld id="{1FAEE4EB-3CC0-47DF-8FBF-9ECC46124670}" type="datetime1">
               <a:rPr lang="fr-FR" noProof="0" smtClean="0"/>
-              <a:t>30/03/2021</a:t>
+              <a:t>31/03/2021</a:t>
             </a:fld>
             <a:endParaRPr lang="fr-FR" noProof="0" dirty="0"/>
           </a:p>
@@ -4108,7 +4108,7 @@
             <a:pPr rtl="0"/>
             <a:fld id="{B30BFA78-DECC-4AE2-BCFC-E0244C2CD3F0}" type="datetime1">
               <a:rPr lang="fr-FR" noProof="0" smtClean="0"/>
-              <a:t>30/03/2021</a:t>
+              <a:t>31/03/2021</a:t>
             </a:fld>
             <a:endParaRPr lang="fr-FR" noProof="0" dirty="0"/>
           </a:p>
@@ -4353,7 +4353,7 @@
             <a:pPr rtl="0"/>
             <a:fld id="{53FED5E6-2CA7-4A65-8E4B-ECDEC3A08145}" type="datetime1">
               <a:rPr lang="fr-FR" noProof="0" smtClean="0"/>
-              <a:t>30/03/2021</a:t>
+              <a:t>31/03/2021</a:t>
             </a:fld>
             <a:endParaRPr lang="fr-FR" noProof="0" dirty="0"/>
           </a:p>
@@ -22901,6 +22901,10 @@
           <a:prstGeom prst="rect">
             <a:avLst/>
           </a:prstGeom>
+          <a:noFill/>
+          <a:ln>
+            <a:noFill/>
+          </a:ln>
         </p:spPr>
         <p:txBody>
           <a:bodyPr wrap="square" lIns="0" tIns="0" rIns="0" bIns="0" rtlCol="0">
@@ -22911,17 +22915,19 @@
             <a:pPr algn="ctr" rtl="0"/>
             <a:r>
               <a:rPr lang="fr-FR" sz="2400" dirty="0">
-                <a:solidFill>
-                  <a:srgbClr val="002060"/>
-                </a:solidFill>
-                <a:hlinkClick r:id="rId3"/>
+                <a:latin typeface="Berlin Sans FB" panose="020E0602020502020306" pitchFamily="34" charset="0"/>
+                <a:hlinkClick r:id="rId3">
+                  <a:extLst>
+                    <a:ext uri="{A12FA001-AC4F-418D-AE19-62706E023703}">
+                      <ahyp:hlinkClr xmlns:ahyp="http://schemas.microsoft.com/office/drawing/2018/hyperlinkcolor" val="tx"/>
+                    </a:ext>
+                  </a:extLst>
+                </a:hlinkClick>
               </a:rPr>
               <a:t>GLOOMAPS</a:t>
             </a:r>
             <a:endParaRPr lang="fr-FR" sz="2400" dirty="0">
-              <a:solidFill>
-                <a:srgbClr val="002060"/>
-              </a:solidFill>
+              <a:latin typeface="Berlin Sans FB" panose="020E0602020502020306" pitchFamily="34" charset="0"/>
             </a:endParaRPr>
           </a:p>
         </p:txBody>
@@ -30004,6 +30010,7 @@
         <p:sp>
           <p:nvSpPr>
             <p:cNvPr id="340" name="Zone de texte 339">
+              <a:hlinkClick r:id="rId4" action="ppaction://hlinksldjump"/>
               <a:extLst>
                 <a:ext uri="{FF2B5EF4-FFF2-40B4-BE49-F238E27FC236}">
                   <a16:creationId xmlns:a16="http://schemas.microsoft.com/office/drawing/2014/main" id="{246A1BD9-59BD-467C-9A84-D6A5E4382773}"/>
@@ -30162,6 +30169,7 @@
         <p:sp>
           <p:nvSpPr>
             <p:cNvPr id="343" name="Zone de texte 342">
+              <a:hlinkClick r:id="rId5" action="ppaction://hlinksldjump"/>
               <a:extLst>
                 <a:ext uri="{FF2B5EF4-FFF2-40B4-BE49-F238E27FC236}">
                   <a16:creationId xmlns:a16="http://schemas.microsoft.com/office/drawing/2014/main" id="{36571B2F-0463-48D1-8CC7-EA6BC8F3FB67}"/>
@@ -30441,7 +30449,7 @@
             <p:nvPr/>
           </p:nvPicPr>
           <p:blipFill>
-            <a:blip r:embed="rId4">
+            <a:blip r:embed="rId6">
               <a:extLst>
                 <a:ext uri="{28A0092B-C50C-407E-A947-70E740481C1C}">
                   <a14:useLocalDpi xmlns:a14="http://schemas.microsoft.com/office/drawing/2010/main" val="0"/>
@@ -30555,7 +30563,7 @@
             <p:nvPr/>
           </p:nvPicPr>
           <p:blipFill>
-            <a:blip r:embed="rId4">
+            <a:blip r:embed="rId6">
               <a:extLst>
                 <a:ext uri="{28A0092B-C50C-407E-A947-70E740481C1C}">
                   <a14:useLocalDpi xmlns:a14="http://schemas.microsoft.com/office/drawing/2010/main" val="0"/>
@@ -30669,7 +30677,7 @@
             <p:nvPr/>
           </p:nvPicPr>
           <p:blipFill>
-            <a:blip r:embed="rId4">
+            <a:blip r:embed="rId6">
               <a:extLst>
                 <a:ext uri="{28A0092B-C50C-407E-A947-70E740481C1C}">
                   <a14:useLocalDpi xmlns:a14="http://schemas.microsoft.com/office/drawing/2010/main" val="0"/>
@@ -30763,7 +30771,7 @@
           <p:nvPr/>
         </p:nvPicPr>
         <p:blipFill>
-          <a:blip r:embed="rId5">
+          <a:blip r:embed="rId7">
             <a:extLst>
               <a:ext uri="{28A0092B-C50C-407E-A947-70E740481C1C}">
                 <a14:useLocalDpi xmlns:a14="http://schemas.microsoft.com/office/drawing/2010/main" val="0"/>
@@ -30856,7 +30864,7 @@
           <p:nvPr/>
         </p:nvPicPr>
         <p:blipFill>
-          <a:blip r:embed="rId5">
+          <a:blip r:embed="rId7">
             <a:extLst>
               <a:ext uri="{28A0092B-C50C-407E-A947-70E740481C1C}">
                 <a14:useLocalDpi xmlns:a14="http://schemas.microsoft.com/office/drawing/2010/main" val="0"/>
@@ -31029,7 +31037,7 @@
           <p:nvPr/>
         </p:nvPicPr>
         <p:blipFill>
-          <a:blip r:embed="rId6">
+          <a:blip r:embed="rId8">
             <a:extLst>
               <a:ext uri="{28A0092B-C50C-407E-A947-70E740481C1C}">
                 <a14:useLocalDpi xmlns:a14="http://schemas.microsoft.com/office/drawing/2010/main" val="0"/>
@@ -39648,8 +39656,8 @@
         </p:nvSpPr>
         <p:spPr>
           <a:xfrm>
-            <a:off x="6372308" y="2033538"/>
-            <a:ext cx="1251361" cy="153888"/>
+            <a:off x="7389899" y="2009958"/>
+            <a:ext cx="307724" cy="153888"/>
           </a:xfrm>
           <a:prstGeom prst="rect">
             <a:avLst/>
@@ -39675,7 +39683,7 @@
                 <a:latin typeface="Berlin Sans FB" panose="020E0602020502020306" pitchFamily="34" charset="0"/>
                 <a:cs typeface="Segoe UI" panose="020B0502040204020203" pitchFamily="34" charset="0"/>
               </a:rPr>
-              <a:t> :</a:t>
+              <a:t> :          </a:t>
             </a:r>
             <a:endParaRPr lang="fr-FR" sz="1000" b="1" dirty="0">
               <a:solidFill>
@@ -40822,7 +40830,7 @@
         </p:nvSpPr>
         <p:spPr>
           <a:xfrm>
-            <a:off x="10625031" y="4448204"/>
+            <a:off x="10528847" y="4442369"/>
             <a:ext cx="1251361" cy="153888"/>
           </a:xfrm>
           <a:prstGeom prst="rect">
@@ -41439,15 +41447,15 @@
           </p:cNvPr>
           <p:cNvCxnSpPr>
             <a:cxnSpLocks/>
-            <a:stCxn id="202" idx="5"/>
+            <a:stCxn id="203" idx="3"/>
             <a:endCxn id="277" idx="1"/>
           </p:cNvCxnSpPr>
           <p:nvPr/>
         </p:nvCxnSpPr>
         <p:spPr>
           <a:xfrm>
-            <a:off x="7138808" y="2329256"/>
-            <a:ext cx="2863010" cy="126748"/>
+            <a:off x="7126710" y="2155127"/>
+            <a:ext cx="2875108" cy="300877"/>
           </a:xfrm>
           <a:prstGeom prst="straightConnector1">
             <a:avLst/>

</xml_diff>